<commit_message>
Correzione di alcuni errori
</commit_message>
<xml_diff>
--- a/docs/analisi/Template use case/Template Use Case - Valutazione affidabilità.pptx
+++ b/docs/analisi/Template use case/Template Use Case - Valutazione affidabilità.pptx
@@ -109,7 +109,7 @@
   </p:defaultTextStyle>
   <p:extLst>
     <p:ext uri="{EFAFB233-063F-42B5-8137-9DF3F51BA10A}">
-      <p15:sldGuideLst xmlns:p15="http://schemas.microsoft.com/office/powerpoint/2012/main" xmlns="">
+      <p15:sldGuideLst xmlns="" xmlns:p15="http://schemas.microsoft.com/office/powerpoint/2012/main">
         <p15:guide id="1" orient="horz" pos="2160">
           <p15:clr>
             <a:srgbClr val="A4A3A4"/>
@@ -302,7 +302,7 @@
           <p:cNvPr id="2" name="Titolo 1">
             <a:extLst>
               <a:ext uri="{FF2B5EF4-FFF2-40B4-BE49-F238E27FC236}">
-                <a16:creationId xmlns:a16="http://schemas.microsoft.com/office/drawing/2014/main" xmlns="" id="{CFBF2858-9FF9-49F6-9325-A5B5D4185723}"/>
+                <a16:creationId xmlns="" xmlns:a16="http://schemas.microsoft.com/office/drawing/2014/main" id="{CFBF2858-9FF9-49F6-9325-A5B5D4185723}"/>
               </a:ext>
             </a:extLst>
           </p:cNvPr>
@@ -339,7 +339,7 @@
           <p:cNvPr id="3" name="Sottotitolo 2">
             <a:extLst>
               <a:ext uri="{FF2B5EF4-FFF2-40B4-BE49-F238E27FC236}">
-                <a16:creationId xmlns:a16="http://schemas.microsoft.com/office/drawing/2014/main" xmlns="" id="{4B21D84B-ED35-4CD0-B889-7022650B2578}"/>
+                <a16:creationId xmlns="" xmlns:a16="http://schemas.microsoft.com/office/drawing/2014/main" id="{4B21D84B-ED35-4CD0-B889-7022650B2578}"/>
               </a:ext>
             </a:extLst>
           </p:cNvPr>
@@ -409,7 +409,7 @@
           <p:cNvPr id="4" name="Segnaposto data 3">
             <a:extLst>
               <a:ext uri="{FF2B5EF4-FFF2-40B4-BE49-F238E27FC236}">
-                <a16:creationId xmlns:a16="http://schemas.microsoft.com/office/drawing/2014/main" xmlns="" id="{E66C651E-1356-4A58-BA17-ECFD882A1A0D}"/>
+                <a16:creationId xmlns="" xmlns:a16="http://schemas.microsoft.com/office/drawing/2014/main" id="{E66C651E-1356-4A58-BA17-ECFD882A1A0D}"/>
               </a:ext>
             </a:extLst>
           </p:cNvPr>
@@ -427,7 +427,7 @@
           <a:p>
             <a:fld id="{F7D71F90-2C6D-44F6-A1F9-0B80B911F8CA}" type="datetimeFigureOut">
               <a:rPr lang="it-IT" smtClean="0"/>
-              <a:t>08/01/2020</a:t>
+              <a:t>10/01/2020</a:t>
             </a:fld>
             <a:endParaRPr lang="it-IT"/>
           </a:p>
@@ -438,7 +438,7 @@
           <p:cNvPr id="5" name="Segnaposto piè di pagina 4">
             <a:extLst>
               <a:ext uri="{FF2B5EF4-FFF2-40B4-BE49-F238E27FC236}">
-                <a16:creationId xmlns:a16="http://schemas.microsoft.com/office/drawing/2014/main" xmlns="" id="{74328D79-8461-43BC-84DA-249AF43BC14A}"/>
+                <a16:creationId xmlns="" xmlns:a16="http://schemas.microsoft.com/office/drawing/2014/main" id="{74328D79-8461-43BC-84DA-249AF43BC14A}"/>
               </a:ext>
             </a:extLst>
           </p:cNvPr>
@@ -463,7 +463,7 @@
           <p:cNvPr id="6" name="Segnaposto numero diapositiva 5">
             <a:extLst>
               <a:ext uri="{FF2B5EF4-FFF2-40B4-BE49-F238E27FC236}">
-                <a16:creationId xmlns:a16="http://schemas.microsoft.com/office/drawing/2014/main" xmlns="" id="{816387D6-94E6-47FE-871A-C8EF03F29BDB}"/>
+                <a16:creationId xmlns="" xmlns:a16="http://schemas.microsoft.com/office/drawing/2014/main" id="{816387D6-94E6-47FE-871A-C8EF03F29BDB}"/>
               </a:ext>
             </a:extLst>
           </p:cNvPr>
@@ -522,7 +522,7 @@
           <p:cNvPr id="2" name="Titolo 1">
             <a:extLst>
               <a:ext uri="{FF2B5EF4-FFF2-40B4-BE49-F238E27FC236}">
-                <a16:creationId xmlns:a16="http://schemas.microsoft.com/office/drawing/2014/main" xmlns="" id="{F59AC4B1-2C56-4BBF-A05F-D9500F78FEB9}"/>
+                <a16:creationId xmlns="" xmlns:a16="http://schemas.microsoft.com/office/drawing/2014/main" id="{F59AC4B1-2C56-4BBF-A05F-D9500F78FEB9}"/>
               </a:ext>
             </a:extLst>
           </p:cNvPr>
@@ -550,7 +550,7 @@
           <p:cNvPr id="3" name="Segnaposto testo verticale 2">
             <a:extLst>
               <a:ext uri="{FF2B5EF4-FFF2-40B4-BE49-F238E27FC236}">
-                <a16:creationId xmlns:a16="http://schemas.microsoft.com/office/drawing/2014/main" xmlns="" id="{90389E8C-63A3-42AB-93CD-0F8792454FCC}"/>
+                <a16:creationId xmlns="" xmlns:a16="http://schemas.microsoft.com/office/drawing/2014/main" id="{90389E8C-63A3-42AB-93CD-0F8792454FCC}"/>
               </a:ext>
             </a:extLst>
           </p:cNvPr>
@@ -607,7 +607,7 @@
           <p:cNvPr id="4" name="Segnaposto data 3">
             <a:extLst>
               <a:ext uri="{FF2B5EF4-FFF2-40B4-BE49-F238E27FC236}">
-                <a16:creationId xmlns:a16="http://schemas.microsoft.com/office/drawing/2014/main" xmlns="" id="{254FADA6-B05E-4B35-A06A-2022D2DBEC26}"/>
+                <a16:creationId xmlns="" xmlns:a16="http://schemas.microsoft.com/office/drawing/2014/main" id="{254FADA6-B05E-4B35-A06A-2022D2DBEC26}"/>
               </a:ext>
             </a:extLst>
           </p:cNvPr>
@@ -625,7 +625,7 @@
           <a:p>
             <a:fld id="{F7D71F90-2C6D-44F6-A1F9-0B80B911F8CA}" type="datetimeFigureOut">
               <a:rPr lang="it-IT" smtClean="0"/>
-              <a:t>08/01/2020</a:t>
+              <a:t>10/01/2020</a:t>
             </a:fld>
             <a:endParaRPr lang="it-IT"/>
           </a:p>
@@ -636,7 +636,7 @@
           <p:cNvPr id="5" name="Segnaposto piè di pagina 4">
             <a:extLst>
               <a:ext uri="{FF2B5EF4-FFF2-40B4-BE49-F238E27FC236}">
-                <a16:creationId xmlns:a16="http://schemas.microsoft.com/office/drawing/2014/main" xmlns="" id="{0631869E-DF6C-4226-B729-2123308FE398}"/>
+                <a16:creationId xmlns="" xmlns:a16="http://schemas.microsoft.com/office/drawing/2014/main" id="{0631869E-DF6C-4226-B729-2123308FE398}"/>
               </a:ext>
             </a:extLst>
           </p:cNvPr>
@@ -661,7 +661,7 @@
           <p:cNvPr id="6" name="Segnaposto numero diapositiva 5">
             <a:extLst>
               <a:ext uri="{FF2B5EF4-FFF2-40B4-BE49-F238E27FC236}">
-                <a16:creationId xmlns:a16="http://schemas.microsoft.com/office/drawing/2014/main" xmlns="" id="{5EBEEC90-B83C-4DEE-937E-C7EC1D025508}"/>
+                <a16:creationId xmlns="" xmlns:a16="http://schemas.microsoft.com/office/drawing/2014/main" id="{5EBEEC90-B83C-4DEE-937E-C7EC1D025508}"/>
               </a:ext>
             </a:extLst>
           </p:cNvPr>
@@ -720,7 +720,7 @@
           <p:cNvPr id="2" name="Titolo verticale 1">
             <a:extLst>
               <a:ext uri="{FF2B5EF4-FFF2-40B4-BE49-F238E27FC236}">
-                <a16:creationId xmlns:a16="http://schemas.microsoft.com/office/drawing/2014/main" xmlns="" id="{30E33601-4D9B-4E96-B3C3-AB65F0C81F37}"/>
+                <a16:creationId xmlns="" xmlns:a16="http://schemas.microsoft.com/office/drawing/2014/main" id="{30E33601-4D9B-4E96-B3C3-AB65F0C81F37}"/>
               </a:ext>
             </a:extLst>
           </p:cNvPr>
@@ -753,7 +753,7 @@
           <p:cNvPr id="3" name="Segnaposto testo verticale 2">
             <a:extLst>
               <a:ext uri="{FF2B5EF4-FFF2-40B4-BE49-F238E27FC236}">
-                <a16:creationId xmlns:a16="http://schemas.microsoft.com/office/drawing/2014/main" xmlns="" id="{FEDAA464-5CD2-4C93-83F5-E13251F55648}"/>
+                <a16:creationId xmlns="" xmlns:a16="http://schemas.microsoft.com/office/drawing/2014/main" id="{FEDAA464-5CD2-4C93-83F5-E13251F55648}"/>
               </a:ext>
             </a:extLst>
           </p:cNvPr>
@@ -815,7 +815,7 @@
           <p:cNvPr id="4" name="Segnaposto data 3">
             <a:extLst>
               <a:ext uri="{FF2B5EF4-FFF2-40B4-BE49-F238E27FC236}">
-                <a16:creationId xmlns:a16="http://schemas.microsoft.com/office/drawing/2014/main" xmlns="" id="{F61719B4-CD99-4540-BEA4-8B7884B7C59C}"/>
+                <a16:creationId xmlns="" xmlns:a16="http://schemas.microsoft.com/office/drawing/2014/main" id="{F61719B4-CD99-4540-BEA4-8B7884B7C59C}"/>
               </a:ext>
             </a:extLst>
           </p:cNvPr>
@@ -833,7 +833,7 @@
           <a:p>
             <a:fld id="{F7D71F90-2C6D-44F6-A1F9-0B80B911F8CA}" type="datetimeFigureOut">
               <a:rPr lang="it-IT" smtClean="0"/>
-              <a:t>08/01/2020</a:t>
+              <a:t>10/01/2020</a:t>
             </a:fld>
             <a:endParaRPr lang="it-IT"/>
           </a:p>
@@ -844,7 +844,7 @@
           <p:cNvPr id="5" name="Segnaposto piè di pagina 4">
             <a:extLst>
               <a:ext uri="{FF2B5EF4-FFF2-40B4-BE49-F238E27FC236}">
-                <a16:creationId xmlns:a16="http://schemas.microsoft.com/office/drawing/2014/main" xmlns="" id="{30F0B4A5-E6FA-4C78-86A7-F528FA130059}"/>
+                <a16:creationId xmlns="" xmlns:a16="http://schemas.microsoft.com/office/drawing/2014/main" id="{30F0B4A5-E6FA-4C78-86A7-F528FA130059}"/>
               </a:ext>
             </a:extLst>
           </p:cNvPr>
@@ -869,7 +869,7 @@
           <p:cNvPr id="6" name="Segnaposto numero diapositiva 5">
             <a:extLst>
               <a:ext uri="{FF2B5EF4-FFF2-40B4-BE49-F238E27FC236}">
-                <a16:creationId xmlns:a16="http://schemas.microsoft.com/office/drawing/2014/main" xmlns="" id="{442BF533-5946-4F10-92FC-3CD5053CF4D8}"/>
+                <a16:creationId xmlns="" xmlns:a16="http://schemas.microsoft.com/office/drawing/2014/main" id="{442BF533-5946-4F10-92FC-3CD5053CF4D8}"/>
               </a:ext>
             </a:extLst>
           </p:cNvPr>
@@ -928,7 +928,7 @@
           <p:cNvPr id="2" name="Titolo 1">
             <a:extLst>
               <a:ext uri="{FF2B5EF4-FFF2-40B4-BE49-F238E27FC236}">
-                <a16:creationId xmlns:a16="http://schemas.microsoft.com/office/drawing/2014/main" xmlns="" id="{8D324EC4-C5F5-4344-815B-63064E440846}"/>
+                <a16:creationId xmlns="" xmlns:a16="http://schemas.microsoft.com/office/drawing/2014/main" id="{8D324EC4-C5F5-4344-815B-63064E440846}"/>
               </a:ext>
             </a:extLst>
           </p:cNvPr>
@@ -956,7 +956,7 @@
           <p:cNvPr id="3" name="Segnaposto contenuto 2">
             <a:extLst>
               <a:ext uri="{FF2B5EF4-FFF2-40B4-BE49-F238E27FC236}">
-                <a16:creationId xmlns:a16="http://schemas.microsoft.com/office/drawing/2014/main" xmlns="" id="{55775342-FE66-4A01-9E0A-B6DFF50813CF}"/>
+                <a16:creationId xmlns="" xmlns:a16="http://schemas.microsoft.com/office/drawing/2014/main" id="{55775342-FE66-4A01-9E0A-B6DFF50813CF}"/>
               </a:ext>
             </a:extLst>
           </p:cNvPr>
@@ -1013,7 +1013,7 @@
           <p:cNvPr id="4" name="Segnaposto data 3">
             <a:extLst>
               <a:ext uri="{FF2B5EF4-FFF2-40B4-BE49-F238E27FC236}">
-                <a16:creationId xmlns:a16="http://schemas.microsoft.com/office/drawing/2014/main" xmlns="" id="{397A9FE5-70AC-44CE-914B-A1E1953D424A}"/>
+                <a16:creationId xmlns="" xmlns:a16="http://schemas.microsoft.com/office/drawing/2014/main" id="{397A9FE5-70AC-44CE-914B-A1E1953D424A}"/>
               </a:ext>
             </a:extLst>
           </p:cNvPr>
@@ -1031,7 +1031,7 @@
           <a:p>
             <a:fld id="{F7D71F90-2C6D-44F6-A1F9-0B80B911F8CA}" type="datetimeFigureOut">
               <a:rPr lang="it-IT" smtClean="0"/>
-              <a:t>08/01/2020</a:t>
+              <a:t>10/01/2020</a:t>
             </a:fld>
             <a:endParaRPr lang="it-IT"/>
           </a:p>
@@ -1042,7 +1042,7 @@
           <p:cNvPr id="5" name="Segnaposto piè di pagina 4">
             <a:extLst>
               <a:ext uri="{FF2B5EF4-FFF2-40B4-BE49-F238E27FC236}">
-                <a16:creationId xmlns:a16="http://schemas.microsoft.com/office/drawing/2014/main" xmlns="" id="{955E82A6-47E5-4A43-8C14-EB032BC59D50}"/>
+                <a16:creationId xmlns="" xmlns:a16="http://schemas.microsoft.com/office/drawing/2014/main" id="{955E82A6-47E5-4A43-8C14-EB032BC59D50}"/>
               </a:ext>
             </a:extLst>
           </p:cNvPr>
@@ -1067,7 +1067,7 @@
           <p:cNvPr id="6" name="Segnaposto numero diapositiva 5">
             <a:extLst>
               <a:ext uri="{FF2B5EF4-FFF2-40B4-BE49-F238E27FC236}">
-                <a16:creationId xmlns:a16="http://schemas.microsoft.com/office/drawing/2014/main" xmlns="" id="{58E8D349-F894-470A-B25E-2196ABC42040}"/>
+                <a16:creationId xmlns="" xmlns:a16="http://schemas.microsoft.com/office/drawing/2014/main" id="{58E8D349-F894-470A-B25E-2196ABC42040}"/>
               </a:ext>
             </a:extLst>
           </p:cNvPr>
@@ -1126,7 +1126,7 @@
           <p:cNvPr id="2" name="Titolo 1">
             <a:extLst>
               <a:ext uri="{FF2B5EF4-FFF2-40B4-BE49-F238E27FC236}">
-                <a16:creationId xmlns:a16="http://schemas.microsoft.com/office/drawing/2014/main" xmlns="" id="{FF8A343A-BEE9-48C2-8F08-6D02BD514F3F}"/>
+                <a16:creationId xmlns="" xmlns:a16="http://schemas.microsoft.com/office/drawing/2014/main" id="{FF8A343A-BEE9-48C2-8F08-6D02BD514F3F}"/>
               </a:ext>
             </a:extLst>
           </p:cNvPr>
@@ -1163,7 +1163,7 @@
           <p:cNvPr id="3" name="Segnaposto testo 2">
             <a:extLst>
               <a:ext uri="{FF2B5EF4-FFF2-40B4-BE49-F238E27FC236}">
-                <a16:creationId xmlns:a16="http://schemas.microsoft.com/office/drawing/2014/main" xmlns="" id="{0909A412-AD76-4989-B06E-E33E0F00580E}"/>
+                <a16:creationId xmlns="" xmlns:a16="http://schemas.microsoft.com/office/drawing/2014/main" id="{0909A412-AD76-4989-B06E-E33E0F00580E}"/>
               </a:ext>
             </a:extLst>
           </p:cNvPr>
@@ -1288,7 +1288,7 @@
           <p:cNvPr id="4" name="Segnaposto data 3">
             <a:extLst>
               <a:ext uri="{FF2B5EF4-FFF2-40B4-BE49-F238E27FC236}">
-                <a16:creationId xmlns:a16="http://schemas.microsoft.com/office/drawing/2014/main" xmlns="" id="{16318882-43E1-4C25-B100-9FE081333575}"/>
+                <a16:creationId xmlns="" xmlns:a16="http://schemas.microsoft.com/office/drawing/2014/main" id="{16318882-43E1-4C25-B100-9FE081333575}"/>
               </a:ext>
             </a:extLst>
           </p:cNvPr>
@@ -1306,7 +1306,7 @@
           <a:p>
             <a:fld id="{F7D71F90-2C6D-44F6-A1F9-0B80B911F8CA}" type="datetimeFigureOut">
               <a:rPr lang="it-IT" smtClean="0"/>
-              <a:t>08/01/2020</a:t>
+              <a:t>10/01/2020</a:t>
             </a:fld>
             <a:endParaRPr lang="it-IT"/>
           </a:p>
@@ -1317,7 +1317,7 @@
           <p:cNvPr id="5" name="Segnaposto piè di pagina 4">
             <a:extLst>
               <a:ext uri="{FF2B5EF4-FFF2-40B4-BE49-F238E27FC236}">
-                <a16:creationId xmlns:a16="http://schemas.microsoft.com/office/drawing/2014/main" xmlns="" id="{C6C78431-C23D-4359-9F41-506C478EC2A0}"/>
+                <a16:creationId xmlns="" xmlns:a16="http://schemas.microsoft.com/office/drawing/2014/main" id="{C6C78431-C23D-4359-9F41-506C478EC2A0}"/>
               </a:ext>
             </a:extLst>
           </p:cNvPr>
@@ -1342,7 +1342,7 @@
           <p:cNvPr id="6" name="Segnaposto numero diapositiva 5">
             <a:extLst>
               <a:ext uri="{FF2B5EF4-FFF2-40B4-BE49-F238E27FC236}">
-                <a16:creationId xmlns:a16="http://schemas.microsoft.com/office/drawing/2014/main" xmlns="" id="{DCF015C2-4C12-42A4-9944-4B1FE7A7FFB1}"/>
+                <a16:creationId xmlns="" xmlns:a16="http://schemas.microsoft.com/office/drawing/2014/main" id="{DCF015C2-4C12-42A4-9944-4B1FE7A7FFB1}"/>
               </a:ext>
             </a:extLst>
           </p:cNvPr>
@@ -1401,7 +1401,7 @@
           <p:cNvPr id="2" name="Titolo 1">
             <a:extLst>
               <a:ext uri="{FF2B5EF4-FFF2-40B4-BE49-F238E27FC236}">
-                <a16:creationId xmlns:a16="http://schemas.microsoft.com/office/drawing/2014/main" xmlns="" id="{7650FD1C-41AC-4FD0-8AF4-B2BFB5ECBDC7}"/>
+                <a16:creationId xmlns="" xmlns:a16="http://schemas.microsoft.com/office/drawing/2014/main" id="{7650FD1C-41AC-4FD0-8AF4-B2BFB5ECBDC7}"/>
               </a:ext>
             </a:extLst>
           </p:cNvPr>
@@ -1429,7 +1429,7 @@
           <p:cNvPr id="3" name="Segnaposto contenuto 2">
             <a:extLst>
               <a:ext uri="{FF2B5EF4-FFF2-40B4-BE49-F238E27FC236}">
-                <a16:creationId xmlns:a16="http://schemas.microsoft.com/office/drawing/2014/main" xmlns="" id="{DD16E77D-6E44-4E42-B7EA-AA87E0A9DBF9}"/>
+                <a16:creationId xmlns="" xmlns:a16="http://schemas.microsoft.com/office/drawing/2014/main" id="{DD16E77D-6E44-4E42-B7EA-AA87E0A9DBF9}"/>
               </a:ext>
             </a:extLst>
           </p:cNvPr>
@@ -1491,7 +1491,7 @@
           <p:cNvPr id="4" name="Segnaposto contenuto 3">
             <a:extLst>
               <a:ext uri="{FF2B5EF4-FFF2-40B4-BE49-F238E27FC236}">
-                <a16:creationId xmlns:a16="http://schemas.microsoft.com/office/drawing/2014/main" xmlns="" id="{844F8AF1-BDF4-4BB6-AA12-D9E74887B7AA}"/>
+                <a16:creationId xmlns="" xmlns:a16="http://schemas.microsoft.com/office/drawing/2014/main" id="{844F8AF1-BDF4-4BB6-AA12-D9E74887B7AA}"/>
               </a:ext>
             </a:extLst>
           </p:cNvPr>
@@ -1553,7 +1553,7 @@
           <p:cNvPr id="5" name="Segnaposto data 4">
             <a:extLst>
               <a:ext uri="{FF2B5EF4-FFF2-40B4-BE49-F238E27FC236}">
-                <a16:creationId xmlns:a16="http://schemas.microsoft.com/office/drawing/2014/main" xmlns="" id="{64E49264-4D9E-4F69-ADBE-5FCE7E088F87}"/>
+                <a16:creationId xmlns="" xmlns:a16="http://schemas.microsoft.com/office/drawing/2014/main" id="{64E49264-4D9E-4F69-ADBE-5FCE7E088F87}"/>
               </a:ext>
             </a:extLst>
           </p:cNvPr>
@@ -1571,7 +1571,7 @@
           <a:p>
             <a:fld id="{F7D71F90-2C6D-44F6-A1F9-0B80B911F8CA}" type="datetimeFigureOut">
               <a:rPr lang="it-IT" smtClean="0"/>
-              <a:t>08/01/2020</a:t>
+              <a:t>10/01/2020</a:t>
             </a:fld>
             <a:endParaRPr lang="it-IT"/>
           </a:p>
@@ -1582,7 +1582,7 @@
           <p:cNvPr id="6" name="Segnaposto piè di pagina 5">
             <a:extLst>
               <a:ext uri="{FF2B5EF4-FFF2-40B4-BE49-F238E27FC236}">
-                <a16:creationId xmlns:a16="http://schemas.microsoft.com/office/drawing/2014/main" xmlns="" id="{6BD94B07-3F97-448F-A14A-F799F51B318D}"/>
+                <a16:creationId xmlns="" xmlns:a16="http://schemas.microsoft.com/office/drawing/2014/main" id="{6BD94B07-3F97-448F-A14A-F799F51B318D}"/>
               </a:ext>
             </a:extLst>
           </p:cNvPr>
@@ -1607,7 +1607,7 @@
           <p:cNvPr id="7" name="Segnaposto numero diapositiva 6">
             <a:extLst>
               <a:ext uri="{FF2B5EF4-FFF2-40B4-BE49-F238E27FC236}">
-                <a16:creationId xmlns:a16="http://schemas.microsoft.com/office/drawing/2014/main" xmlns="" id="{B0CD1917-F8A2-456F-82E6-C095438948B0}"/>
+                <a16:creationId xmlns="" xmlns:a16="http://schemas.microsoft.com/office/drawing/2014/main" id="{B0CD1917-F8A2-456F-82E6-C095438948B0}"/>
               </a:ext>
             </a:extLst>
           </p:cNvPr>
@@ -1666,7 +1666,7 @@
           <p:cNvPr id="2" name="Titolo 1">
             <a:extLst>
               <a:ext uri="{FF2B5EF4-FFF2-40B4-BE49-F238E27FC236}">
-                <a16:creationId xmlns:a16="http://schemas.microsoft.com/office/drawing/2014/main" xmlns="" id="{B58BF815-104D-4049-9B9F-5BEFA614935C}"/>
+                <a16:creationId xmlns="" xmlns:a16="http://schemas.microsoft.com/office/drawing/2014/main" id="{B58BF815-104D-4049-9B9F-5BEFA614935C}"/>
               </a:ext>
             </a:extLst>
           </p:cNvPr>
@@ -1699,7 +1699,7 @@
           <p:cNvPr id="3" name="Segnaposto testo 2">
             <a:extLst>
               <a:ext uri="{FF2B5EF4-FFF2-40B4-BE49-F238E27FC236}">
-                <a16:creationId xmlns:a16="http://schemas.microsoft.com/office/drawing/2014/main" xmlns="" id="{CAE85FF7-9C0E-4DB9-A6AB-9133F631A4B3}"/>
+                <a16:creationId xmlns="" xmlns:a16="http://schemas.microsoft.com/office/drawing/2014/main" id="{CAE85FF7-9C0E-4DB9-A6AB-9133F631A4B3}"/>
               </a:ext>
             </a:extLst>
           </p:cNvPr>
@@ -1770,7 +1770,7 @@
           <p:cNvPr id="4" name="Segnaposto contenuto 3">
             <a:extLst>
               <a:ext uri="{FF2B5EF4-FFF2-40B4-BE49-F238E27FC236}">
-                <a16:creationId xmlns:a16="http://schemas.microsoft.com/office/drawing/2014/main" xmlns="" id="{31A1FF07-A483-4CBC-B502-D2040A241C59}"/>
+                <a16:creationId xmlns="" xmlns:a16="http://schemas.microsoft.com/office/drawing/2014/main" id="{31A1FF07-A483-4CBC-B502-D2040A241C59}"/>
               </a:ext>
             </a:extLst>
           </p:cNvPr>
@@ -1832,7 +1832,7 @@
           <p:cNvPr id="5" name="Segnaposto testo 4">
             <a:extLst>
               <a:ext uri="{FF2B5EF4-FFF2-40B4-BE49-F238E27FC236}">
-                <a16:creationId xmlns:a16="http://schemas.microsoft.com/office/drawing/2014/main" xmlns="" id="{30D9E67F-0023-4AD8-8149-34BD4C055D4E}"/>
+                <a16:creationId xmlns="" xmlns:a16="http://schemas.microsoft.com/office/drawing/2014/main" id="{30D9E67F-0023-4AD8-8149-34BD4C055D4E}"/>
               </a:ext>
             </a:extLst>
           </p:cNvPr>
@@ -1903,7 +1903,7 @@
           <p:cNvPr id="6" name="Segnaposto contenuto 5">
             <a:extLst>
               <a:ext uri="{FF2B5EF4-FFF2-40B4-BE49-F238E27FC236}">
-                <a16:creationId xmlns:a16="http://schemas.microsoft.com/office/drawing/2014/main" xmlns="" id="{23831668-98C0-4979-87D7-959474A9085E}"/>
+                <a16:creationId xmlns="" xmlns:a16="http://schemas.microsoft.com/office/drawing/2014/main" id="{23831668-98C0-4979-87D7-959474A9085E}"/>
               </a:ext>
             </a:extLst>
           </p:cNvPr>
@@ -1965,7 +1965,7 @@
           <p:cNvPr id="7" name="Segnaposto data 6">
             <a:extLst>
               <a:ext uri="{FF2B5EF4-FFF2-40B4-BE49-F238E27FC236}">
-                <a16:creationId xmlns:a16="http://schemas.microsoft.com/office/drawing/2014/main" xmlns="" id="{91B922F5-7D11-4052-AF29-AA3B75B06734}"/>
+                <a16:creationId xmlns="" xmlns:a16="http://schemas.microsoft.com/office/drawing/2014/main" id="{91B922F5-7D11-4052-AF29-AA3B75B06734}"/>
               </a:ext>
             </a:extLst>
           </p:cNvPr>
@@ -1983,7 +1983,7 @@
           <a:p>
             <a:fld id="{F7D71F90-2C6D-44F6-A1F9-0B80B911F8CA}" type="datetimeFigureOut">
               <a:rPr lang="it-IT" smtClean="0"/>
-              <a:t>08/01/2020</a:t>
+              <a:t>10/01/2020</a:t>
             </a:fld>
             <a:endParaRPr lang="it-IT"/>
           </a:p>
@@ -1994,7 +1994,7 @@
           <p:cNvPr id="8" name="Segnaposto piè di pagina 7">
             <a:extLst>
               <a:ext uri="{FF2B5EF4-FFF2-40B4-BE49-F238E27FC236}">
-                <a16:creationId xmlns:a16="http://schemas.microsoft.com/office/drawing/2014/main" xmlns="" id="{6EA02A2F-7388-4F42-A4C6-2A7660ED38E4}"/>
+                <a16:creationId xmlns="" xmlns:a16="http://schemas.microsoft.com/office/drawing/2014/main" id="{6EA02A2F-7388-4F42-A4C6-2A7660ED38E4}"/>
               </a:ext>
             </a:extLst>
           </p:cNvPr>
@@ -2019,7 +2019,7 @@
           <p:cNvPr id="9" name="Segnaposto numero diapositiva 8">
             <a:extLst>
               <a:ext uri="{FF2B5EF4-FFF2-40B4-BE49-F238E27FC236}">
-                <a16:creationId xmlns:a16="http://schemas.microsoft.com/office/drawing/2014/main" xmlns="" id="{CB48DB9B-4650-4AD2-89EF-29E9A37B5E48}"/>
+                <a16:creationId xmlns="" xmlns:a16="http://schemas.microsoft.com/office/drawing/2014/main" id="{CB48DB9B-4650-4AD2-89EF-29E9A37B5E48}"/>
               </a:ext>
             </a:extLst>
           </p:cNvPr>
@@ -2078,7 +2078,7 @@
           <p:cNvPr id="2" name="Titolo 1">
             <a:extLst>
               <a:ext uri="{FF2B5EF4-FFF2-40B4-BE49-F238E27FC236}">
-                <a16:creationId xmlns:a16="http://schemas.microsoft.com/office/drawing/2014/main" xmlns="" id="{7FEFC453-E380-4034-875E-863F49914714}"/>
+                <a16:creationId xmlns="" xmlns:a16="http://schemas.microsoft.com/office/drawing/2014/main" id="{7FEFC453-E380-4034-875E-863F49914714}"/>
               </a:ext>
             </a:extLst>
           </p:cNvPr>
@@ -2106,7 +2106,7 @@
           <p:cNvPr id="3" name="Segnaposto data 2">
             <a:extLst>
               <a:ext uri="{FF2B5EF4-FFF2-40B4-BE49-F238E27FC236}">
-                <a16:creationId xmlns:a16="http://schemas.microsoft.com/office/drawing/2014/main" xmlns="" id="{5BC16F08-373A-43EF-8FBC-2D846E43D6B9}"/>
+                <a16:creationId xmlns="" xmlns:a16="http://schemas.microsoft.com/office/drawing/2014/main" id="{5BC16F08-373A-43EF-8FBC-2D846E43D6B9}"/>
               </a:ext>
             </a:extLst>
           </p:cNvPr>
@@ -2124,7 +2124,7 @@
           <a:p>
             <a:fld id="{F7D71F90-2C6D-44F6-A1F9-0B80B911F8CA}" type="datetimeFigureOut">
               <a:rPr lang="it-IT" smtClean="0"/>
-              <a:t>08/01/2020</a:t>
+              <a:t>10/01/2020</a:t>
             </a:fld>
             <a:endParaRPr lang="it-IT"/>
           </a:p>
@@ -2135,7 +2135,7 @@
           <p:cNvPr id="4" name="Segnaposto piè di pagina 3">
             <a:extLst>
               <a:ext uri="{FF2B5EF4-FFF2-40B4-BE49-F238E27FC236}">
-                <a16:creationId xmlns:a16="http://schemas.microsoft.com/office/drawing/2014/main" xmlns="" id="{2A78CDAE-3535-434E-BF92-560FEDD6C387}"/>
+                <a16:creationId xmlns="" xmlns:a16="http://schemas.microsoft.com/office/drawing/2014/main" id="{2A78CDAE-3535-434E-BF92-560FEDD6C387}"/>
               </a:ext>
             </a:extLst>
           </p:cNvPr>
@@ -2160,7 +2160,7 @@
           <p:cNvPr id="5" name="Segnaposto numero diapositiva 4">
             <a:extLst>
               <a:ext uri="{FF2B5EF4-FFF2-40B4-BE49-F238E27FC236}">
-                <a16:creationId xmlns:a16="http://schemas.microsoft.com/office/drawing/2014/main" xmlns="" id="{FAD2588D-B079-4FE5-B454-629CF3E310A3}"/>
+                <a16:creationId xmlns="" xmlns:a16="http://schemas.microsoft.com/office/drawing/2014/main" id="{FAD2588D-B079-4FE5-B454-629CF3E310A3}"/>
               </a:ext>
             </a:extLst>
           </p:cNvPr>
@@ -2219,7 +2219,7 @@
           <p:cNvPr id="2" name="Segnaposto data 1">
             <a:extLst>
               <a:ext uri="{FF2B5EF4-FFF2-40B4-BE49-F238E27FC236}">
-                <a16:creationId xmlns:a16="http://schemas.microsoft.com/office/drawing/2014/main" xmlns="" id="{D9E26DD7-8914-4A23-85B9-0C03B3ACA40C}"/>
+                <a16:creationId xmlns="" xmlns:a16="http://schemas.microsoft.com/office/drawing/2014/main" id="{D9E26DD7-8914-4A23-85B9-0C03B3ACA40C}"/>
               </a:ext>
             </a:extLst>
           </p:cNvPr>
@@ -2237,7 +2237,7 @@
           <a:p>
             <a:fld id="{F7D71F90-2C6D-44F6-A1F9-0B80B911F8CA}" type="datetimeFigureOut">
               <a:rPr lang="it-IT" smtClean="0"/>
-              <a:t>08/01/2020</a:t>
+              <a:t>10/01/2020</a:t>
             </a:fld>
             <a:endParaRPr lang="it-IT"/>
           </a:p>
@@ -2248,7 +2248,7 @@
           <p:cNvPr id="3" name="Segnaposto piè di pagina 2">
             <a:extLst>
               <a:ext uri="{FF2B5EF4-FFF2-40B4-BE49-F238E27FC236}">
-                <a16:creationId xmlns:a16="http://schemas.microsoft.com/office/drawing/2014/main" xmlns="" id="{992E87C0-E01E-4B5D-B829-69CEB0DB0D77}"/>
+                <a16:creationId xmlns="" xmlns:a16="http://schemas.microsoft.com/office/drawing/2014/main" id="{992E87C0-E01E-4B5D-B829-69CEB0DB0D77}"/>
               </a:ext>
             </a:extLst>
           </p:cNvPr>
@@ -2273,7 +2273,7 @@
           <p:cNvPr id="4" name="Segnaposto numero diapositiva 3">
             <a:extLst>
               <a:ext uri="{FF2B5EF4-FFF2-40B4-BE49-F238E27FC236}">
-                <a16:creationId xmlns:a16="http://schemas.microsoft.com/office/drawing/2014/main" xmlns="" id="{F7867DD9-A762-457F-A406-B864D98AA788}"/>
+                <a16:creationId xmlns="" xmlns:a16="http://schemas.microsoft.com/office/drawing/2014/main" id="{F7867DD9-A762-457F-A406-B864D98AA788}"/>
               </a:ext>
             </a:extLst>
           </p:cNvPr>
@@ -2332,7 +2332,7 @@
           <p:cNvPr id="2" name="Titolo 1">
             <a:extLst>
               <a:ext uri="{FF2B5EF4-FFF2-40B4-BE49-F238E27FC236}">
-                <a16:creationId xmlns:a16="http://schemas.microsoft.com/office/drawing/2014/main" xmlns="" id="{76124E57-2EC1-4A69-8B20-E15B6D22940F}"/>
+                <a16:creationId xmlns="" xmlns:a16="http://schemas.microsoft.com/office/drawing/2014/main" id="{76124E57-2EC1-4A69-8B20-E15B6D22940F}"/>
               </a:ext>
             </a:extLst>
           </p:cNvPr>
@@ -2369,7 +2369,7 @@
           <p:cNvPr id="3" name="Segnaposto contenuto 2">
             <a:extLst>
               <a:ext uri="{FF2B5EF4-FFF2-40B4-BE49-F238E27FC236}">
-                <a16:creationId xmlns:a16="http://schemas.microsoft.com/office/drawing/2014/main" xmlns="" id="{734D8066-1E08-4CE8-983F-9BBA87274CC7}"/>
+                <a16:creationId xmlns="" xmlns:a16="http://schemas.microsoft.com/office/drawing/2014/main" id="{734D8066-1E08-4CE8-983F-9BBA87274CC7}"/>
               </a:ext>
             </a:extLst>
           </p:cNvPr>
@@ -2459,7 +2459,7 @@
           <p:cNvPr id="4" name="Segnaposto testo 3">
             <a:extLst>
               <a:ext uri="{FF2B5EF4-FFF2-40B4-BE49-F238E27FC236}">
-                <a16:creationId xmlns:a16="http://schemas.microsoft.com/office/drawing/2014/main" xmlns="" id="{F3FA6396-D906-40C8-AE24-510E2F78C7FE}"/>
+                <a16:creationId xmlns="" xmlns:a16="http://schemas.microsoft.com/office/drawing/2014/main" id="{F3FA6396-D906-40C8-AE24-510E2F78C7FE}"/>
               </a:ext>
             </a:extLst>
           </p:cNvPr>
@@ -2530,7 +2530,7 @@
           <p:cNvPr id="5" name="Segnaposto data 4">
             <a:extLst>
               <a:ext uri="{FF2B5EF4-FFF2-40B4-BE49-F238E27FC236}">
-                <a16:creationId xmlns:a16="http://schemas.microsoft.com/office/drawing/2014/main" xmlns="" id="{BAA5942A-3BCE-4482-8A5C-CD97772E8976}"/>
+                <a16:creationId xmlns="" xmlns:a16="http://schemas.microsoft.com/office/drawing/2014/main" id="{BAA5942A-3BCE-4482-8A5C-CD97772E8976}"/>
               </a:ext>
             </a:extLst>
           </p:cNvPr>
@@ -2548,7 +2548,7 @@
           <a:p>
             <a:fld id="{F7D71F90-2C6D-44F6-A1F9-0B80B911F8CA}" type="datetimeFigureOut">
               <a:rPr lang="it-IT" smtClean="0"/>
-              <a:t>08/01/2020</a:t>
+              <a:t>10/01/2020</a:t>
             </a:fld>
             <a:endParaRPr lang="it-IT"/>
           </a:p>
@@ -2559,7 +2559,7 @@
           <p:cNvPr id="6" name="Segnaposto piè di pagina 5">
             <a:extLst>
               <a:ext uri="{FF2B5EF4-FFF2-40B4-BE49-F238E27FC236}">
-                <a16:creationId xmlns:a16="http://schemas.microsoft.com/office/drawing/2014/main" xmlns="" id="{99420126-9AFA-4777-BFF5-366C09F8B32E}"/>
+                <a16:creationId xmlns="" xmlns:a16="http://schemas.microsoft.com/office/drawing/2014/main" id="{99420126-9AFA-4777-BFF5-366C09F8B32E}"/>
               </a:ext>
             </a:extLst>
           </p:cNvPr>
@@ -2584,7 +2584,7 @@
           <p:cNvPr id="7" name="Segnaposto numero diapositiva 6">
             <a:extLst>
               <a:ext uri="{FF2B5EF4-FFF2-40B4-BE49-F238E27FC236}">
-                <a16:creationId xmlns:a16="http://schemas.microsoft.com/office/drawing/2014/main" xmlns="" id="{87996299-B8B2-4606-A686-94BC7B31D834}"/>
+                <a16:creationId xmlns="" xmlns:a16="http://schemas.microsoft.com/office/drawing/2014/main" id="{87996299-B8B2-4606-A686-94BC7B31D834}"/>
               </a:ext>
             </a:extLst>
           </p:cNvPr>
@@ -2643,7 +2643,7 @@
           <p:cNvPr id="2" name="Titolo 1">
             <a:extLst>
               <a:ext uri="{FF2B5EF4-FFF2-40B4-BE49-F238E27FC236}">
-                <a16:creationId xmlns:a16="http://schemas.microsoft.com/office/drawing/2014/main" xmlns="" id="{B966293D-979C-4064-9F2B-6124C51E68FE}"/>
+                <a16:creationId xmlns="" xmlns:a16="http://schemas.microsoft.com/office/drawing/2014/main" id="{B966293D-979C-4064-9F2B-6124C51E68FE}"/>
               </a:ext>
             </a:extLst>
           </p:cNvPr>
@@ -2680,7 +2680,7 @@
           <p:cNvPr id="3" name="Segnaposto immagine 2">
             <a:extLst>
               <a:ext uri="{FF2B5EF4-FFF2-40B4-BE49-F238E27FC236}">
-                <a16:creationId xmlns:a16="http://schemas.microsoft.com/office/drawing/2014/main" xmlns="" id="{6A8C2EA0-142A-454E-BAAB-7C4485D60299}"/>
+                <a16:creationId xmlns="" xmlns:a16="http://schemas.microsoft.com/office/drawing/2014/main" id="{6A8C2EA0-142A-454E-BAAB-7C4485D60299}"/>
               </a:ext>
             </a:extLst>
           </p:cNvPr>
@@ -2747,7 +2747,7 @@
           <p:cNvPr id="4" name="Segnaposto testo 3">
             <a:extLst>
               <a:ext uri="{FF2B5EF4-FFF2-40B4-BE49-F238E27FC236}">
-                <a16:creationId xmlns:a16="http://schemas.microsoft.com/office/drawing/2014/main" xmlns="" id="{41AB84A7-19D9-44FE-8513-77CAF35AA7C2}"/>
+                <a16:creationId xmlns="" xmlns:a16="http://schemas.microsoft.com/office/drawing/2014/main" id="{41AB84A7-19D9-44FE-8513-77CAF35AA7C2}"/>
               </a:ext>
             </a:extLst>
           </p:cNvPr>
@@ -2818,7 +2818,7 @@
           <p:cNvPr id="5" name="Segnaposto data 4">
             <a:extLst>
               <a:ext uri="{FF2B5EF4-FFF2-40B4-BE49-F238E27FC236}">
-                <a16:creationId xmlns:a16="http://schemas.microsoft.com/office/drawing/2014/main" xmlns="" id="{8BE837FD-91EA-47CC-A6A0-F23A450D108C}"/>
+                <a16:creationId xmlns="" xmlns:a16="http://schemas.microsoft.com/office/drawing/2014/main" id="{8BE837FD-91EA-47CC-A6A0-F23A450D108C}"/>
               </a:ext>
             </a:extLst>
           </p:cNvPr>
@@ -2836,7 +2836,7 @@
           <a:p>
             <a:fld id="{F7D71F90-2C6D-44F6-A1F9-0B80B911F8CA}" type="datetimeFigureOut">
               <a:rPr lang="it-IT" smtClean="0"/>
-              <a:t>08/01/2020</a:t>
+              <a:t>10/01/2020</a:t>
             </a:fld>
             <a:endParaRPr lang="it-IT"/>
           </a:p>
@@ -2847,7 +2847,7 @@
           <p:cNvPr id="6" name="Segnaposto piè di pagina 5">
             <a:extLst>
               <a:ext uri="{FF2B5EF4-FFF2-40B4-BE49-F238E27FC236}">
-                <a16:creationId xmlns:a16="http://schemas.microsoft.com/office/drawing/2014/main" xmlns="" id="{81B3C88D-C08B-4A45-BF0D-04C3264EB32A}"/>
+                <a16:creationId xmlns="" xmlns:a16="http://schemas.microsoft.com/office/drawing/2014/main" id="{81B3C88D-C08B-4A45-BF0D-04C3264EB32A}"/>
               </a:ext>
             </a:extLst>
           </p:cNvPr>
@@ -2872,7 +2872,7 @@
           <p:cNvPr id="7" name="Segnaposto numero diapositiva 6">
             <a:extLst>
               <a:ext uri="{FF2B5EF4-FFF2-40B4-BE49-F238E27FC236}">
-                <a16:creationId xmlns:a16="http://schemas.microsoft.com/office/drawing/2014/main" xmlns="" id="{C35DA505-C2B5-4A20-A0ED-32D6B7B4CE44}"/>
+                <a16:creationId xmlns="" xmlns:a16="http://schemas.microsoft.com/office/drawing/2014/main" id="{C35DA505-C2B5-4A20-A0ED-32D6B7B4CE44}"/>
               </a:ext>
             </a:extLst>
           </p:cNvPr>
@@ -2936,7 +2936,7 @@
           <p:cNvPr id="2" name="Segnaposto titolo 1">
             <a:extLst>
               <a:ext uri="{FF2B5EF4-FFF2-40B4-BE49-F238E27FC236}">
-                <a16:creationId xmlns:a16="http://schemas.microsoft.com/office/drawing/2014/main" xmlns="" id="{4B1D921F-2C48-4285-A8BD-792591D929C6}"/>
+                <a16:creationId xmlns="" xmlns:a16="http://schemas.microsoft.com/office/drawing/2014/main" id="{4B1D921F-2C48-4285-A8BD-792591D929C6}"/>
               </a:ext>
             </a:extLst>
           </p:cNvPr>
@@ -2974,7 +2974,7 @@
           <p:cNvPr id="3" name="Segnaposto testo 2">
             <a:extLst>
               <a:ext uri="{FF2B5EF4-FFF2-40B4-BE49-F238E27FC236}">
-                <a16:creationId xmlns:a16="http://schemas.microsoft.com/office/drawing/2014/main" xmlns="" id="{518CFD04-AD80-4442-9D20-77C3C390CCFF}"/>
+                <a16:creationId xmlns="" xmlns:a16="http://schemas.microsoft.com/office/drawing/2014/main" id="{518CFD04-AD80-4442-9D20-77C3C390CCFF}"/>
               </a:ext>
             </a:extLst>
           </p:cNvPr>
@@ -3041,7 +3041,7 @@
           <p:cNvPr id="4" name="Segnaposto data 3">
             <a:extLst>
               <a:ext uri="{FF2B5EF4-FFF2-40B4-BE49-F238E27FC236}">
-                <a16:creationId xmlns:a16="http://schemas.microsoft.com/office/drawing/2014/main" xmlns="" id="{2D1ACE57-994B-471D-A0C5-61CE109C7E59}"/>
+                <a16:creationId xmlns="" xmlns:a16="http://schemas.microsoft.com/office/drawing/2014/main" id="{2D1ACE57-994B-471D-A0C5-61CE109C7E59}"/>
               </a:ext>
             </a:extLst>
           </p:cNvPr>
@@ -3077,7 +3077,7 @@
           <a:p>
             <a:fld id="{F7D71F90-2C6D-44F6-A1F9-0B80B911F8CA}" type="datetimeFigureOut">
               <a:rPr lang="it-IT" smtClean="0"/>
-              <a:t>08/01/2020</a:t>
+              <a:t>10/01/2020</a:t>
             </a:fld>
             <a:endParaRPr lang="it-IT"/>
           </a:p>
@@ -3088,7 +3088,7 @@
           <p:cNvPr id="5" name="Segnaposto piè di pagina 4">
             <a:extLst>
               <a:ext uri="{FF2B5EF4-FFF2-40B4-BE49-F238E27FC236}">
-                <a16:creationId xmlns:a16="http://schemas.microsoft.com/office/drawing/2014/main" xmlns="" id="{311C4A1E-1E5A-4141-9735-E37F71E2C7B0}"/>
+                <a16:creationId xmlns="" xmlns:a16="http://schemas.microsoft.com/office/drawing/2014/main" id="{311C4A1E-1E5A-4141-9735-E37F71E2C7B0}"/>
               </a:ext>
             </a:extLst>
           </p:cNvPr>
@@ -3131,7 +3131,7 @@
           <p:cNvPr id="6" name="Segnaposto numero diapositiva 5">
             <a:extLst>
               <a:ext uri="{FF2B5EF4-FFF2-40B4-BE49-F238E27FC236}">
-                <a16:creationId xmlns:a16="http://schemas.microsoft.com/office/drawing/2014/main" xmlns="" id="{5C64D511-420E-43E5-BCD4-81BC958B8929}"/>
+                <a16:creationId xmlns="" xmlns:a16="http://schemas.microsoft.com/office/drawing/2014/main" id="{5C64D511-420E-43E5-BCD4-81BC958B8929}"/>
               </a:ext>
             </a:extLst>
           </p:cNvPr>
@@ -3507,10 +3507,10 @@
           <p:cNvPr id="17" name="Rectangle 16">
             <a:extLst>
               <a:ext uri="{FF2B5EF4-FFF2-40B4-BE49-F238E27FC236}">
-                <a16:creationId xmlns:a16="http://schemas.microsoft.com/office/drawing/2014/main" xmlns="" id="{CDA1A2E9-63FE-408D-A803-8E306ECAB4B3}"/>
+                <a16:creationId xmlns="" xmlns:a16="http://schemas.microsoft.com/office/drawing/2014/main" id="{CDA1A2E9-63FE-408D-A803-8E306ECAB4B3}"/>
               </a:ext>
               <a:ext uri="{C183D7F6-B498-43B3-948B-1728B52AA6E4}">
-                <adec:decorative xmlns:adec="http://schemas.microsoft.com/office/drawing/2017/decorative" xmlns="" val="1"/>
+                <adec:decorative xmlns="" xmlns:adec="http://schemas.microsoft.com/office/drawing/2017/decorative" val="1"/>
               </a:ext>
             </a:extLst>
           </p:cNvPr>
@@ -3520,7 +3520,7 @@
           <p:nvPr>
             <p:extLst>
               <p:ext uri="{386F3935-93C4-4BCD-93E2-E3B085C9AB24}">
-                <p16:designElem xmlns:p16="http://schemas.microsoft.com/office/powerpoint/2015/main" xmlns="" val="1"/>
+                <p16:designElem xmlns="" xmlns:p16="http://schemas.microsoft.com/office/powerpoint/2015/main" val="1"/>
               </p:ext>
             </p:extLst>
           </p:nvPr>
@@ -3599,7 +3599,7 @@
           <p:cNvPr id="2" name="Titolo 1">
             <a:extLst>
               <a:ext uri="{FF2B5EF4-FFF2-40B4-BE49-F238E27FC236}">
-                <a16:creationId xmlns:a16="http://schemas.microsoft.com/office/drawing/2014/main" xmlns="" id="{DCBAC149-DB9F-4874-BC24-7F077AA4B78D}"/>
+                <a16:creationId xmlns="" xmlns:a16="http://schemas.microsoft.com/office/drawing/2014/main" id="{DCBAC149-DB9F-4874-BC24-7F077AA4B78D}"/>
               </a:ext>
             </a:extLst>
           </p:cNvPr>
@@ -3639,10 +3639,10 @@
           <p:cNvPr id="19" name="Rectangle 18">
             <a:extLst>
               <a:ext uri="{FF2B5EF4-FFF2-40B4-BE49-F238E27FC236}">
-                <a16:creationId xmlns:a16="http://schemas.microsoft.com/office/drawing/2014/main" xmlns="" id="{FBE9F90C-C163-435B-9A68-D15C92D1CF2B}"/>
+                <a16:creationId xmlns="" xmlns:a16="http://schemas.microsoft.com/office/drawing/2014/main" id="{FBE9F90C-C163-435B-9A68-D15C92D1CF2B}"/>
               </a:ext>
               <a:ext uri="{C183D7F6-B498-43B3-948B-1728B52AA6E4}">
-                <adec:decorative xmlns:adec="http://schemas.microsoft.com/office/drawing/2017/decorative" xmlns="" val="1"/>
+                <adec:decorative xmlns="" xmlns:adec="http://schemas.microsoft.com/office/drawing/2017/decorative" val="1"/>
               </a:ext>
             </a:extLst>
           </p:cNvPr>
@@ -3652,7 +3652,7 @@
           <p:nvPr>
             <p:extLst>
               <p:ext uri="{386F3935-93C4-4BCD-93E2-E3B085C9AB24}">
-                <p16:designElem xmlns:p16="http://schemas.microsoft.com/office/powerpoint/2015/main" xmlns="" val="1"/>
+                <p16:designElem xmlns="" xmlns:p16="http://schemas.microsoft.com/office/powerpoint/2015/main" val="1"/>
               </p:ext>
             </p:extLst>
           </p:nvPr>
@@ -3733,7 +3733,7 @@
           <p:cNvPr id="3" name="Sottotitolo 2">
             <a:extLst>
               <a:ext uri="{FF2B5EF4-FFF2-40B4-BE49-F238E27FC236}">
-                <a16:creationId xmlns:a16="http://schemas.microsoft.com/office/drawing/2014/main" xmlns="" id="{B9F686C4-B595-4CDD-8233-91A53C48A369}"/>
+                <a16:creationId xmlns="" xmlns:a16="http://schemas.microsoft.com/office/drawing/2014/main" id="{B9F686C4-B595-4CDD-8233-91A53C48A369}"/>
               </a:ext>
             </a:extLst>
           </p:cNvPr>
@@ -3773,10 +3773,10 @@
           <p:cNvPr id="21" name="Rectangle 20">
             <a:extLst>
               <a:ext uri="{FF2B5EF4-FFF2-40B4-BE49-F238E27FC236}">
-                <a16:creationId xmlns:a16="http://schemas.microsoft.com/office/drawing/2014/main" xmlns="" id="{1A882A9F-F4E9-4E23-8F0B-20B5DF42EAA9}"/>
+                <a16:creationId xmlns="" xmlns:a16="http://schemas.microsoft.com/office/drawing/2014/main" id="{1A882A9F-F4E9-4E23-8F0B-20B5DF42EAA9}"/>
               </a:ext>
               <a:ext uri="{C183D7F6-B498-43B3-948B-1728B52AA6E4}">
-                <adec:decorative xmlns:adec="http://schemas.microsoft.com/office/drawing/2017/decorative" xmlns="" val="1"/>
+                <adec:decorative xmlns="" xmlns:adec="http://schemas.microsoft.com/office/drawing/2017/decorative" val="1"/>
               </a:ext>
             </a:extLst>
           </p:cNvPr>
@@ -3786,7 +3786,7 @@
           <p:nvPr>
             <p:extLst>
               <p:ext uri="{386F3935-93C4-4BCD-93E2-E3B085C9AB24}">
-                <p16:designElem xmlns:p16="http://schemas.microsoft.com/office/powerpoint/2015/main" xmlns="" val="1"/>
+                <p16:designElem xmlns="" xmlns:p16="http://schemas.microsoft.com/office/powerpoint/2015/main" val="1"/>
               </p:ext>
             </p:extLst>
           </p:nvPr>
@@ -3867,7 +3867,7 @@
           <p:cNvPr id="14" name="Graphic 13" descr="Pollice su">
             <a:extLst>
               <a:ext uri="{FF2B5EF4-FFF2-40B4-BE49-F238E27FC236}">
-                <a16:creationId xmlns:a16="http://schemas.microsoft.com/office/drawing/2014/main" xmlns="" id="{FC0883BF-9DEF-4B2D-86E7-ADEC7F5720CD}"/>
+                <a16:creationId xmlns="" xmlns:a16="http://schemas.microsoft.com/office/drawing/2014/main" id="{FC0883BF-9DEF-4B2D-86E7-ADEC7F5720CD}"/>
               </a:ext>
             </a:extLst>
           </p:cNvPr>
@@ -3883,7 +3883,7 @@
                 <a14:useLocalDpi xmlns:a14="http://schemas.microsoft.com/office/drawing/2010/main" val="0"/>
               </a:ext>
               <a:ext uri="{96DAC541-7B7A-43D3-8B79-37D633B846F1}">
-                <asvg:svgBlip xmlns:asvg="http://schemas.microsoft.com/office/drawing/2016/SVG/main" xmlns="" r:embed="rId3"/>
+                <asvg:svgBlip xmlns="" xmlns:asvg="http://schemas.microsoft.com/office/drawing/2016/SVG/main" r:embed="rId3"/>
               </a:ext>
             </a:extLst>
           </a:blip>
@@ -3935,7 +3935,7 @@
           <p:cNvPr id="2" name="Titolo 1">
             <a:extLst>
               <a:ext uri="{FF2B5EF4-FFF2-40B4-BE49-F238E27FC236}">
-                <a16:creationId xmlns:a16="http://schemas.microsoft.com/office/drawing/2014/main" xmlns="" id="{B7EC37DD-9E0C-4C6E-A811-00302AD6EACB}"/>
+                <a16:creationId xmlns="" xmlns:a16="http://schemas.microsoft.com/office/drawing/2014/main" id="{B7EC37DD-9E0C-4C6E-A811-00302AD6EACB}"/>
               </a:ext>
             </a:extLst>
           </p:cNvPr>
@@ -3968,7 +3968,7 @@
           <p:cNvPr id="4" name="Tabella 4">
             <a:extLst>
               <a:ext uri="{FF2B5EF4-FFF2-40B4-BE49-F238E27FC236}">
-                <a16:creationId xmlns:a16="http://schemas.microsoft.com/office/drawing/2014/main" xmlns="" id="{043F75E0-1B48-4C2E-8ADF-C8441714A81A}"/>
+                <a16:creationId xmlns="" xmlns:a16="http://schemas.microsoft.com/office/drawing/2014/main" id="{043F75E0-1B48-4C2E-8ADF-C8441714A81A}"/>
               </a:ext>
             </a:extLst>
           </p:cNvPr>
@@ -3998,14 +3998,14 @@
                 <a:gridCol w="2483498">
                   <a:extLst>
                     <a:ext uri="{9D8B030D-6E8A-4147-A177-3AD203B41FA5}">
-                      <a16:colId xmlns:a16="http://schemas.microsoft.com/office/drawing/2014/main" xmlns="" val="414173828"/>
+                      <a16:colId xmlns="" xmlns:a16="http://schemas.microsoft.com/office/drawing/2014/main" val="414173828"/>
                     </a:ext>
                   </a:extLst>
                 </a:gridCol>
                 <a:gridCol w="8032102">
                   <a:extLst>
                     <a:ext uri="{9D8B030D-6E8A-4147-A177-3AD203B41FA5}">
-                      <a16:colId xmlns:a16="http://schemas.microsoft.com/office/drawing/2014/main" xmlns="" val="418542194"/>
+                      <a16:colId xmlns="" xmlns:a16="http://schemas.microsoft.com/office/drawing/2014/main" val="418542194"/>
                     </a:ext>
                   </a:extLst>
                 </a:gridCol>
@@ -4039,7 +4039,7 @@
                 </a:tc>
                 <a:extLst>
                   <a:ext uri="{0D108BD9-81ED-4DB2-BD59-A6C34878D82A}">
-                    <a16:rowId xmlns:a16="http://schemas.microsoft.com/office/drawing/2014/main" xmlns="" val="246340804"/>
+                    <a16:rowId xmlns="" xmlns:a16="http://schemas.microsoft.com/office/drawing/2014/main" val="246340804"/>
                   </a:ext>
                 </a:extLst>
               </a:tr>
@@ -4072,7 +4072,7 @@
                 </a:tc>
                 <a:extLst>
                   <a:ext uri="{0D108BD9-81ED-4DB2-BD59-A6C34878D82A}">
-                    <a16:rowId xmlns:a16="http://schemas.microsoft.com/office/drawing/2014/main" xmlns="" val="2368987764"/>
+                    <a16:rowId xmlns="" xmlns:a16="http://schemas.microsoft.com/office/drawing/2014/main" val="2368987764"/>
                   </a:ext>
                 </a:extLst>
               </a:tr>
@@ -4105,7 +4105,7 @@
                 </a:tc>
                 <a:extLst>
                   <a:ext uri="{0D108BD9-81ED-4DB2-BD59-A6C34878D82A}">
-                    <a16:rowId xmlns:a16="http://schemas.microsoft.com/office/drawing/2014/main" xmlns="" val="301388857"/>
+                    <a16:rowId xmlns="" xmlns:a16="http://schemas.microsoft.com/office/drawing/2014/main" val="301388857"/>
                   </a:ext>
                 </a:extLst>
               </a:tr>
@@ -4138,7 +4138,7 @@
                 </a:tc>
                 <a:extLst>
                   <a:ext uri="{0D108BD9-81ED-4DB2-BD59-A6C34878D82A}">
-                    <a16:rowId xmlns:a16="http://schemas.microsoft.com/office/drawing/2014/main" xmlns="" val="2333084500"/>
+                    <a16:rowId xmlns="" xmlns:a16="http://schemas.microsoft.com/office/drawing/2014/main" val="2333084500"/>
                   </a:ext>
                 </a:extLst>
               </a:tr>
@@ -4171,7 +4171,7 @@
                 </a:tc>
                 <a:extLst>
                   <a:ext uri="{0D108BD9-81ED-4DB2-BD59-A6C34878D82A}">
-                    <a16:rowId xmlns:a16="http://schemas.microsoft.com/office/drawing/2014/main" xmlns="" val="2773735045"/>
+                    <a16:rowId xmlns="" xmlns:a16="http://schemas.microsoft.com/office/drawing/2014/main" val="2773735045"/>
                   </a:ext>
                 </a:extLst>
               </a:tr>
@@ -4229,7 +4229,7 @@
                 </a:tc>
                 <a:extLst>
                   <a:ext uri="{0D108BD9-81ED-4DB2-BD59-A6C34878D82A}">
-                    <a16:rowId xmlns:a16="http://schemas.microsoft.com/office/drawing/2014/main" xmlns="" val="3315426333"/>
+                    <a16:rowId xmlns="" xmlns:a16="http://schemas.microsoft.com/office/drawing/2014/main" val="3315426333"/>
                   </a:ext>
                 </a:extLst>
               </a:tr>
@@ -4274,7 +4274,7 @@
                 </a:tc>
                 <a:extLst>
                   <a:ext uri="{0D108BD9-81ED-4DB2-BD59-A6C34878D82A}">
-                    <a16:rowId xmlns:a16="http://schemas.microsoft.com/office/drawing/2014/main" xmlns="" val="833276135"/>
+                    <a16:rowId xmlns="" xmlns:a16="http://schemas.microsoft.com/office/drawing/2014/main" val="833276135"/>
                   </a:ext>
                 </a:extLst>
               </a:tr>
@@ -4304,7 +4304,7 @@
                 </a:tc>
                 <a:extLst>
                   <a:ext uri="{0D108BD9-81ED-4DB2-BD59-A6C34878D82A}">
-                    <a16:rowId xmlns:a16="http://schemas.microsoft.com/office/drawing/2014/main" xmlns="" val="1615278520"/>
+                    <a16:rowId xmlns="" xmlns:a16="http://schemas.microsoft.com/office/drawing/2014/main" val="1615278520"/>
                   </a:ext>
                 </a:extLst>
               </a:tr>
@@ -4317,7 +4317,7 @@
           <p:cNvPr id="7" name="Elemento grafico 6" descr="Informazioni">
             <a:extLst>
               <a:ext uri="{FF2B5EF4-FFF2-40B4-BE49-F238E27FC236}">
-                <a16:creationId xmlns:a16="http://schemas.microsoft.com/office/drawing/2014/main" xmlns="" id="{53D936C3-6DDC-4194-987E-7AE9EFD9723F}"/>
+                <a16:creationId xmlns="" xmlns:a16="http://schemas.microsoft.com/office/drawing/2014/main" id="{53D936C3-6DDC-4194-987E-7AE9EFD9723F}"/>
               </a:ext>
             </a:extLst>
           </p:cNvPr>
@@ -4333,7 +4333,7 @@
                 <a14:useLocalDpi xmlns:a14="http://schemas.microsoft.com/office/drawing/2010/main" val="0"/>
               </a:ext>
               <a:ext uri="{96DAC541-7B7A-43D3-8B79-37D633B846F1}">
-                <asvg:svgBlip xmlns:asvg="http://schemas.microsoft.com/office/drawing/2016/SVG/main" xmlns="" r:embed="rId3"/>
+                <asvg:svgBlip xmlns="" xmlns:asvg="http://schemas.microsoft.com/office/drawing/2016/SVG/main" r:embed="rId3"/>
               </a:ext>
             </a:extLst>
           </a:blip>
@@ -4386,7 +4386,7 @@
           <p:cNvPr id="2" name="Titolo 1">
             <a:extLst>
               <a:ext uri="{FF2B5EF4-FFF2-40B4-BE49-F238E27FC236}">
-                <a16:creationId xmlns:a16="http://schemas.microsoft.com/office/drawing/2014/main" xmlns="" id="{FF61BD71-50E0-44C1-A558-965A7ABC70AD}"/>
+                <a16:creationId xmlns="" xmlns:a16="http://schemas.microsoft.com/office/drawing/2014/main" id="{FF61BD71-50E0-44C1-A558-965A7ABC70AD}"/>
               </a:ext>
             </a:extLst>
           </p:cNvPr>
@@ -4414,7 +4414,7 @@
           <p:cNvPr id="4" name="Tabella 4">
             <a:extLst>
               <a:ext uri="{FF2B5EF4-FFF2-40B4-BE49-F238E27FC236}">
-                <a16:creationId xmlns:a16="http://schemas.microsoft.com/office/drawing/2014/main" xmlns="" id="{0BC89AA1-366F-4BE5-824E-0153DB6DF5C3}"/>
+                <a16:creationId xmlns="" xmlns:a16="http://schemas.microsoft.com/office/drawing/2014/main" id="{0BC89AA1-366F-4BE5-824E-0153DB6DF5C3}"/>
               </a:ext>
             </a:extLst>
           </p:cNvPr>
@@ -4425,7 +4425,7 @@
             <p:ph idx="1"/>
             <p:extLst>
               <p:ext uri="{D42A27DB-BD31-4B8C-83A1-F6EECF244321}">
-                <p14:modId xmlns:p14="http://schemas.microsoft.com/office/powerpoint/2010/main" val="3188284996"/>
+                <p14:modId xmlns:p14="http://schemas.microsoft.com/office/powerpoint/2010/main" val="3505941332"/>
               </p:ext>
             </p:extLst>
           </p:nvPr>
@@ -4444,14 +4444,14 @@
                 <a:gridCol w="2866053">
                   <a:extLst>
                     <a:ext uri="{9D8B030D-6E8A-4147-A177-3AD203B41FA5}">
-                      <a16:colId xmlns:a16="http://schemas.microsoft.com/office/drawing/2014/main" xmlns="" val="3900888184"/>
+                      <a16:colId xmlns="" xmlns:a16="http://schemas.microsoft.com/office/drawing/2014/main" val="3900888184"/>
                     </a:ext>
                   </a:extLst>
                 </a:gridCol>
                 <a:gridCol w="7649547">
                   <a:extLst>
                     <a:ext uri="{9D8B030D-6E8A-4147-A177-3AD203B41FA5}">
-                      <a16:colId xmlns:a16="http://schemas.microsoft.com/office/drawing/2014/main" xmlns="" val="2392364571"/>
+                      <a16:colId xmlns="" xmlns:a16="http://schemas.microsoft.com/office/drawing/2014/main" val="2392364571"/>
                     </a:ext>
                   </a:extLst>
                 </a:gridCol>
@@ -4490,7 +4490,7 @@
                 </a:tc>
                 <a:extLst>
                   <a:ext uri="{0D108BD9-81ED-4DB2-BD59-A6C34878D82A}">
-                    <a16:rowId xmlns:a16="http://schemas.microsoft.com/office/drawing/2014/main" xmlns="" val="2750207453"/>
+                    <a16:rowId xmlns="" xmlns:a16="http://schemas.microsoft.com/office/drawing/2014/main" val="2750207453"/>
                   </a:ext>
                 </a:extLst>
               </a:tr>
@@ -4523,7 +4523,7 @@
                 </a:tc>
                 <a:extLst>
                   <a:ext uri="{0D108BD9-81ED-4DB2-BD59-A6C34878D82A}">
-                    <a16:rowId xmlns:a16="http://schemas.microsoft.com/office/drawing/2014/main" xmlns="" val="43365482"/>
+                    <a16:rowId xmlns="" xmlns:a16="http://schemas.microsoft.com/office/drawing/2014/main" val="43365482"/>
                   </a:ext>
                 </a:extLst>
               </a:tr>
@@ -4547,8 +4547,12 @@
                     <a:lstStyle/>
                     <a:p>
                       <a:r>
+                        <a:rPr lang="it-IT" dirty="0" smtClean="0"/>
+                        <a:t>Gli </a:t>
+                      </a:r>
+                      <a:r>
                         <a:rPr lang="it-IT" dirty="0"/>
-                        <a:t>I utenti possono trovare i distributori con il servizio migliore</a:t>
+                        <a:t>utenti possono trovare i distributori con il servizio migliore</a:t>
                       </a:r>
                     </a:p>
                   </a:txBody>
@@ -4556,7 +4560,7 @@
                 </a:tc>
                 <a:extLst>
                   <a:ext uri="{0D108BD9-81ED-4DB2-BD59-A6C34878D82A}">
-                    <a16:rowId xmlns:a16="http://schemas.microsoft.com/office/drawing/2014/main" xmlns="" val="1813106428"/>
+                    <a16:rowId xmlns="" xmlns:a16="http://schemas.microsoft.com/office/drawing/2014/main" val="1813106428"/>
                   </a:ext>
                 </a:extLst>
               </a:tr>
@@ -4589,7 +4593,7 @@
                 </a:tc>
                 <a:extLst>
                   <a:ext uri="{0D108BD9-81ED-4DB2-BD59-A6C34878D82A}">
-                    <a16:rowId xmlns:a16="http://schemas.microsoft.com/office/drawing/2014/main" xmlns="" val="4265491522"/>
+                    <a16:rowId xmlns="" xmlns:a16="http://schemas.microsoft.com/office/drawing/2014/main" val="4265491522"/>
                   </a:ext>
                 </a:extLst>
               </a:tr>
@@ -4619,7 +4623,7 @@
                 </a:tc>
                 <a:extLst>
                   <a:ext uri="{0D108BD9-81ED-4DB2-BD59-A6C34878D82A}">
-                    <a16:rowId xmlns:a16="http://schemas.microsoft.com/office/drawing/2014/main" xmlns="" val="1759204447"/>
+                    <a16:rowId xmlns="" xmlns:a16="http://schemas.microsoft.com/office/drawing/2014/main" val="1759204447"/>
                   </a:ext>
                 </a:extLst>
               </a:tr>
@@ -4668,7 +4672,7 @@
                 </a:tc>
                 <a:extLst>
                   <a:ext uri="{0D108BD9-81ED-4DB2-BD59-A6C34878D82A}">
-                    <a16:rowId xmlns:a16="http://schemas.microsoft.com/office/drawing/2014/main" xmlns="" val="4176074482"/>
+                    <a16:rowId xmlns="" xmlns:a16="http://schemas.microsoft.com/office/drawing/2014/main" val="4176074482"/>
                   </a:ext>
                 </a:extLst>
               </a:tr>
@@ -4701,7 +4705,7 @@
                 </a:tc>
                 <a:extLst>
                   <a:ext uri="{0D108BD9-81ED-4DB2-BD59-A6C34878D82A}">
-                    <a16:rowId xmlns:a16="http://schemas.microsoft.com/office/drawing/2014/main" xmlns="" val="2176725863"/>
+                    <a16:rowId xmlns="" xmlns:a16="http://schemas.microsoft.com/office/drawing/2014/main" val="2176725863"/>
                   </a:ext>
                 </a:extLst>
               </a:tr>
@@ -4714,7 +4718,7 @@
           <p:cNvPr id="7" name="Elemento grafico 6" descr="Alta tensione">
             <a:extLst>
               <a:ext uri="{FF2B5EF4-FFF2-40B4-BE49-F238E27FC236}">
-                <a16:creationId xmlns:a16="http://schemas.microsoft.com/office/drawing/2014/main" xmlns="" id="{4BC6B4F9-BBF9-493A-8CEC-E6BC93390131}"/>
+                <a16:creationId xmlns="" xmlns:a16="http://schemas.microsoft.com/office/drawing/2014/main" id="{4BC6B4F9-BBF9-493A-8CEC-E6BC93390131}"/>
               </a:ext>
             </a:extLst>
           </p:cNvPr>
@@ -4730,7 +4734,7 @@
                 <a14:useLocalDpi xmlns:a14="http://schemas.microsoft.com/office/drawing/2010/main" val="0"/>
               </a:ext>
               <a:ext uri="{96DAC541-7B7A-43D3-8B79-37D633B846F1}">
-                <asvg:svgBlip xmlns:asvg="http://schemas.microsoft.com/office/drawing/2016/SVG/main" xmlns="" r:embed="rId3"/>
+                <asvg:svgBlip xmlns="" xmlns:asvg="http://schemas.microsoft.com/office/drawing/2016/SVG/main" r:embed="rId3"/>
               </a:ext>
             </a:extLst>
           </a:blip>
@@ -4783,7 +4787,7 @@
           <p:cNvPr id="2" name="Titolo 1">
             <a:extLst>
               <a:ext uri="{FF2B5EF4-FFF2-40B4-BE49-F238E27FC236}">
-                <a16:creationId xmlns:a16="http://schemas.microsoft.com/office/drawing/2014/main" xmlns="" id="{A8B055A1-B3E5-4E97-BAF3-4C33FEAE38D5}"/>
+                <a16:creationId xmlns="" xmlns:a16="http://schemas.microsoft.com/office/drawing/2014/main" id="{A8B055A1-B3E5-4E97-BAF3-4C33FEAE38D5}"/>
               </a:ext>
             </a:extLst>
           </p:cNvPr>
@@ -4817,7 +4821,7 @@
           <p:cNvPr id="4" name="Tabella 4">
             <a:extLst>
               <a:ext uri="{FF2B5EF4-FFF2-40B4-BE49-F238E27FC236}">
-                <a16:creationId xmlns:a16="http://schemas.microsoft.com/office/drawing/2014/main" xmlns="" id="{67C1CEAA-13A3-482D-AA09-BF3FC903FFE5}"/>
+                <a16:creationId xmlns="" xmlns:a16="http://schemas.microsoft.com/office/drawing/2014/main" id="{67C1CEAA-13A3-482D-AA09-BF3FC903FFE5}"/>
               </a:ext>
             </a:extLst>
           </p:cNvPr>
@@ -4847,14 +4851,14 @@
                 <a:gridCol w="2688771">
                   <a:extLst>
                     <a:ext uri="{9D8B030D-6E8A-4147-A177-3AD203B41FA5}">
-                      <a16:colId xmlns:a16="http://schemas.microsoft.com/office/drawing/2014/main" xmlns="" val="634955233"/>
+                      <a16:colId xmlns="" xmlns:a16="http://schemas.microsoft.com/office/drawing/2014/main" val="634955233"/>
                     </a:ext>
                   </a:extLst>
                 </a:gridCol>
                 <a:gridCol w="7826829">
                   <a:extLst>
                     <a:ext uri="{9D8B030D-6E8A-4147-A177-3AD203B41FA5}">
-                      <a16:colId xmlns:a16="http://schemas.microsoft.com/office/drawing/2014/main" xmlns="" val="1784330953"/>
+                      <a16:colId xmlns="" xmlns:a16="http://schemas.microsoft.com/office/drawing/2014/main" val="1784330953"/>
                     </a:ext>
                   </a:extLst>
                 </a:gridCol>
@@ -4937,7 +4941,7 @@
                 </a:tc>
                 <a:extLst>
                   <a:ext uri="{0D108BD9-81ED-4DB2-BD59-A6C34878D82A}">
-                    <a16:rowId xmlns:a16="http://schemas.microsoft.com/office/drawing/2014/main" xmlns="" val="400559187"/>
+                    <a16:rowId xmlns="" xmlns:a16="http://schemas.microsoft.com/office/drawing/2014/main" val="400559187"/>
                   </a:ext>
                 </a:extLst>
               </a:tr>
@@ -4970,7 +4974,7 @@
                 </a:tc>
                 <a:extLst>
                   <a:ext uri="{0D108BD9-81ED-4DB2-BD59-A6C34878D82A}">
-                    <a16:rowId xmlns:a16="http://schemas.microsoft.com/office/drawing/2014/main" xmlns="" val="286916072"/>
+                    <a16:rowId xmlns="" xmlns:a16="http://schemas.microsoft.com/office/drawing/2014/main" val="286916072"/>
                   </a:ext>
                 </a:extLst>
               </a:tr>
@@ -5003,7 +5007,7 @@
                 </a:tc>
                 <a:extLst>
                   <a:ext uri="{0D108BD9-81ED-4DB2-BD59-A6C34878D82A}">
-                    <a16:rowId xmlns:a16="http://schemas.microsoft.com/office/drawing/2014/main" xmlns="" val="1276537878"/>
+                    <a16:rowId xmlns="" xmlns:a16="http://schemas.microsoft.com/office/drawing/2014/main" val="1276537878"/>
                   </a:ext>
                 </a:extLst>
               </a:tr>
@@ -5016,7 +5020,7 @@
           <p:cNvPr id="8" name="Elemento grafico 7" descr="Flusso di lavoro">
             <a:extLst>
               <a:ext uri="{FF2B5EF4-FFF2-40B4-BE49-F238E27FC236}">
-                <a16:creationId xmlns:a16="http://schemas.microsoft.com/office/drawing/2014/main" xmlns="" id="{A495AF70-8473-45AA-80C8-B98D01FB12D2}"/>
+                <a16:creationId xmlns="" xmlns:a16="http://schemas.microsoft.com/office/drawing/2014/main" id="{A495AF70-8473-45AA-80C8-B98D01FB12D2}"/>
               </a:ext>
             </a:extLst>
           </p:cNvPr>
@@ -5032,7 +5036,7 @@
                 <a14:useLocalDpi xmlns:a14="http://schemas.microsoft.com/office/drawing/2010/main" val="0"/>
               </a:ext>
               <a:ext uri="{96DAC541-7B7A-43D3-8B79-37D633B846F1}">
-                <asvg:svgBlip xmlns:asvg="http://schemas.microsoft.com/office/drawing/2016/SVG/main" xmlns="" r:embed="rId3"/>
+                <asvg:svgBlip xmlns="" xmlns:asvg="http://schemas.microsoft.com/office/drawing/2016/SVG/main" r:embed="rId3"/>
               </a:ext>
             </a:extLst>
           </a:blip>
@@ -5352,7 +5356,7 @@
   <a:extraClrSchemeLst/>
   <a:extLst>
     <a:ext uri="{05A4C25C-085E-4340-85A3-A5531E510DB2}">
-      <thm15:themeFamily xmlns:thm15="http://schemas.microsoft.com/office/thememl/2012/main" xmlns="" name="Office Theme" id="{62F939B6-93AF-4DB8-9C6B-D6C7DFDC589F}" vid="{4A3C46E8-61CC-4603-A589-7422A47A8E4A}"/>
+      <thm15:themeFamily xmlns="" xmlns:thm15="http://schemas.microsoft.com/office/thememl/2012/main" name="Office Theme" id="{62F939B6-93AF-4DB8-9C6B-D6C7DFDC589F}" vid="{4A3C46E8-61CC-4603-A589-7422A47A8E4A}"/>
     </a:ext>
   </a:extLst>
 </a:theme>

</xml_diff>